<commit_message>
Added final version for presentation
</commit_message>
<xml_diff>
--- a/prd/tcc_apresentacao.pptx
+++ b/prd/tcc_apresentacao.pptx
@@ -21,6 +21,7 @@
     <p:sldId id="280" r:id="rId15"/>
     <p:sldId id="278" r:id="rId16"/>
     <p:sldId id="279" r:id="rId17"/>
+    <p:sldId id="281" r:id="rId18"/>
   </p:sldIdLst>
   <p:sldSz cx="12192000" cy="6858000"/>
   <p:notesSz cx="6858000" cy="9144000"/>
@@ -414,7 +415,7 @@
           <a:p>
             <a:fld id="{588D7303-1349-4B3B-906B-0AD17F7A84D3}" type="datetimeFigureOut">
               <a:rPr lang="pt-BR" smtClean="0"/>
-              <a:t>02/10/2023</a:t>
+              <a:t>05/10/2023</a:t>
             </a:fld>
             <a:endParaRPr lang="pt-BR"/>
           </a:p>
@@ -622,7 +623,7 @@
           <a:p>
             <a:fld id="{588D7303-1349-4B3B-906B-0AD17F7A84D3}" type="datetimeFigureOut">
               <a:rPr lang="pt-BR" smtClean="0"/>
-              <a:t>02/10/2023</a:t>
+              <a:t>05/10/2023</a:t>
             </a:fld>
             <a:endParaRPr lang="pt-BR"/>
           </a:p>
@@ -820,7 +821,7 @@
           <a:p>
             <a:fld id="{588D7303-1349-4B3B-906B-0AD17F7A84D3}" type="datetimeFigureOut">
               <a:rPr lang="pt-BR" smtClean="0"/>
-              <a:t>02/10/2023</a:t>
+              <a:t>05/10/2023</a:t>
             </a:fld>
             <a:endParaRPr lang="pt-BR"/>
           </a:p>
@@ -1095,7 +1096,7 @@
           <a:p>
             <a:fld id="{588D7303-1349-4B3B-906B-0AD17F7A84D3}" type="datetimeFigureOut">
               <a:rPr lang="pt-BR" smtClean="0"/>
-              <a:t>02/10/2023</a:t>
+              <a:t>05/10/2023</a:t>
             </a:fld>
             <a:endParaRPr lang="pt-BR"/>
           </a:p>
@@ -1360,7 +1361,7 @@
           <a:p>
             <a:fld id="{588D7303-1349-4B3B-906B-0AD17F7A84D3}" type="datetimeFigureOut">
               <a:rPr lang="pt-BR" smtClean="0"/>
-              <a:t>02/10/2023</a:t>
+              <a:t>05/10/2023</a:t>
             </a:fld>
             <a:endParaRPr lang="pt-BR"/>
           </a:p>
@@ -1772,7 +1773,7 @@
           <a:p>
             <a:fld id="{588D7303-1349-4B3B-906B-0AD17F7A84D3}" type="datetimeFigureOut">
               <a:rPr lang="pt-BR" smtClean="0"/>
-              <a:t>02/10/2023</a:t>
+              <a:t>05/10/2023</a:t>
             </a:fld>
             <a:endParaRPr lang="pt-BR"/>
           </a:p>
@@ -1913,7 +1914,7 @@
           <a:p>
             <a:fld id="{588D7303-1349-4B3B-906B-0AD17F7A84D3}" type="datetimeFigureOut">
               <a:rPr lang="pt-BR" smtClean="0"/>
-              <a:t>02/10/2023</a:t>
+              <a:t>05/10/2023</a:t>
             </a:fld>
             <a:endParaRPr lang="pt-BR"/>
           </a:p>
@@ -2026,7 +2027,7 @@
           <a:p>
             <a:fld id="{588D7303-1349-4B3B-906B-0AD17F7A84D3}" type="datetimeFigureOut">
               <a:rPr lang="pt-BR" smtClean="0"/>
-              <a:t>02/10/2023</a:t>
+              <a:t>05/10/2023</a:t>
             </a:fld>
             <a:endParaRPr lang="pt-BR"/>
           </a:p>
@@ -2337,7 +2338,7 @@
           <a:p>
             <a:fld id="{588D7303-1349-4B3B-906B-0AD17F7A84D3}" type="datetimeFigureOut">
               <a:rPr lang="pt-BR" smtClean="0"/>
-              <a:t>02/10/2023</a:t>
+              <a:t>05/10/2023</a:t>
             </a:fld>
             <a:endParaRPr lang="pt-BR"/>
           </a:p>
@@ -2625,7 +2626,7 @@
           <a:p>
             <a:fld id="{588D7303-1349-4B3B-906B-0AD17F7A84D3}" type="datetimeFigureOut">
               <a:rPr lang="pt-BR" smtClean="0"/>
-              <a:t>02/10/2023</a:t>
+              <a:t>05/10/2023</a:t>
             </a:fld>
             <a:endParaRPr lang="pt-BR"/>
           </a:p>
@@ -2875,7 +2876,7 @@
           <a:p>
             <a:fld id="{588D7303-1349-4B3B-906B-0AD17F7A84D3}" type="datetimeFigureOut">
               <a:rPr lang="pt-BR" smtClean="0"/>
-              <a:t>02/10/2023</a:t>
+              <a:t>05/10/2023</a:t>
             </a:fld>
             <a:endParaRPr lang="pt-BR"/>
           </a:p>
@@ -3701,7 +3702,7 @@
                 <a:effectLst/>
                 <a:latin typeface="Helvetica" pitchFamily="2" charset="0"/>
               </a:rPr>
-              <a:t>retorna resultados no intervalo de -1 a 1 (Figura 6). </a:t>
+              <a:t>retorna resultados no intervalo de -1 a 1 (Figura 7). </a:t>
             </a:r>
           </a:p>
         </p:txBody>
@@ -3737,7 +3738,7 @@
         </p:blipFill>
         <p:spPr>
           <a:xfrm>
-            <a:off x="6911007" y="1822064"/>
+            <a:off x="6911007" y="1851244"/>
             <a:ext cx="4442793" cy="3089130"/>
           </a:xfrm>
           <a:prstGeom prst="rect">
@@ -3759,8 +3760,8 @@
         </p:nvSpPr>
         <p:spPr>
           <a:xfrm>
-            <a:off x="10163419" y="1545065"/>
-            <a:ext cx="1100928" cy="276999"/>
+            <a:off x="6911007" y="1574245"/>
+            <a:ext cx="4353340" cy="276999"/>
           </a:xfrm>
           <a:prstGeom prst="rect">
             <a:avLst/>
@@ -3773,13 +3774,12 @@
           </a:bodyPr>
           <a:lstStyle/>
           <a:p>
-            <a:pPr algn="r"/>
             <a:r>
               <a:rPr lang="pt-BR" sz="1200" dirty="0">
                 <a:latin typeface="Helvetica" pitchFamily="2" charset="0"/>
                 <a:cs typeface="Arial" panose="020B0604020202020204" pitchFamily="34" charset="0"/>
               </a:rPr>
-              <a:t>Figura 6</a:t>
+              <a:t>Figura 7: Exemplo de resultados para quatro empresas</a:t>
             </a:r>
           </a:p>
         </p:txBody>
@@ -4088,8 +4088,8 @@
           </p:sp>
         </mc:Fallback>
       </mc:AlternateContent>
-      <mc:AlternateContent xmlns:mc="http://schemas.openxmlformats.org/markup-compatibility/2006">
-        <mc:Choice xmlns:a14="http://schemas.microsoft.com/office/drawing/2010/main" Requires="a14">
+      <mc:AlternateContent xmlns:mc="http://schemas.openxmlformats.org/markup-compatibility/2006" xmlns:a14="http://schemas.microsoft.com/office/drawing/2010/main">
+        <mc:Choice Requires="a14">
           <p:sp>
             <p:nvSpPr>
               <p:cNvPr id="22" name="CaixaDeTexto 21">
@@ -4302,7 +4302,7 @@
             </p:txBody>
           </p:sp>
         </mc:Choice>
-        <mc:Fallback>
+        <mc:Fallback xmlns="">
           <p:sp>
             <p:nvSpPr>
               <p:cNvPr id="22" name="CaixaDeTexto 21">
@@ -4637,7 +4637,7 @@
                 <a:effectLst/>
                 <a:latin typeface="Helvetica" pitchFamily="2" charset="0"/>
               </a:rPr>
-              <a:t>de 0 a 1 (Figura 7). </a:t>
+              <a:t>de 0 a 1 (Figura 8). </a:t>
             </a:r>
           </a:p>
         </p:txBody>
@@ -4656,8 +4656,8 @@
         </p:nvSpPr>
         <p:spPr>
           <a:xfrm>
-            <a:off x="10123664" y="1545065"/>
-            <a:ext cx="1100928" cy="276999"/>
+            <a:off x="6876297" y="1545065"/>
+            <a:ext cx="4348295" cy="276999"/>
           </a:xfrm>
           <a:prstGeom prst="rect">
             <a:avLst/>
@@ -4670,13 +4670,12 @@
           </a:bodyPr>
           <a:lstStyle/>
           <a:p>
-            <a:pPr algn="r"/>
             <a:r>
               <a:rPr lang="pt-BR" sz="1200" dirty="0">
                 <a:latin typeface="Helvetica" pitchFamily="2" charset="0"/>
                 <a:cs typeface="Arial" panose="020B0604020202020204" pitchFamily="34" charset="0"/>
               </a:rPr>
-              <a:t>Figura 7</a:t>
+              <a:t>Figura 8: Exemplo de resultados para quatro empresas</a:t>
             </a:r>
           </a:p>
         </p:txBody>
@@ -5519,7 +5518,7 @@
         <p:spPr>
           <a:xfrm>
             <a:off x="838200" y="1825625"/>
-            <a:ext cx="4262120" cy="4489450"/>
+            <a:ext cx="5173494" cy="4489450"/>
           </a:xfrm>
         </p:spPr>
         <p:txBody>
@@ -5593,17 +5592,55 @@
                 <a:effectLst/>
                 <a:latin typeface="Helvetica" pitchFamily="2" charset="0"/>
               </a:rPr>
-              <a:t>O conjunto apresenta cauda à direita mais longa e pico acentuado em comparação à distribuição normal (Figura 8).</a:t>
+              <a:t>O conjunto apresenta cauda à direita mais longa e pico acentuado em comparação à distribuição normal (Figura 9).</a:t>
+            </a:r>
+          </a:p>
+        </p:txBody>
+      </p:sp>
+      <p:sp>
+        <p:nvSpPr>
+          <p:cNvPr id="8" name="CaixaDeTexto 7">
+            <a:extLst>
+              <a:ext uri="{FF2B5EF4-FFF2-40B4-BE49-F238E27FC236}">
+                <a16:creationId xmlns:a16="http://schemas.microsoft.com/office/drawing/2014/main" id="{347181AC-D10B-BDCA-FF56-BF0D84F03CB8}"/>
+              </a:ext>
+            </a:extLst>
+          </p:cNvPr>
+          <p:cNvSpPr txBox="1"/>
+          <p:nvPr/>
+        </p:nvSpPr>
+        <p:spPr>
+          <a:xfrm>
+            <a:off x="6096000" y="5065964"/>
+            <a:ext cx="5173494" cy="276999"/>
+          </a:xfrm>
+          <a:prstGeom prst="rect">
+            <a:avLst/>
+          </a:prstGeom>
+          <a:noFill/>
+        </p:spPr>
+        <p:txBody>
+          <a:bodyPr wrap="square" rtlCol="0">
+            <a:spAutoFit/>
+          </a:bodyPr>
+          <a:lstStyle/>
+          <a:p>
+            <a:r>
+              <a:rPr lang="pt-BR" sz="1200" dirty="0">
+                <a:latin typeface="Helvetica" pitchFamily="2" charset="0"/>
+                <a:cs typeface="Arial" panose="020B0604020202020204" pitchFamily="34" charset="0"/>
+              </a:rPr>
+              <a:t>Figura 9: Assimetria e curtose do conjunto</a:t>
             </a:r>
           </a:p>
         </p:txBody>
       </p:sp>
       <p:pic>
         <p:nvPicPr>
-          <p:cNvPr id="7" name="Gráfico 6">
-            <a:extLst>
-              <a:ext uri="{FF2B5EF4-FFF2-40B4-BE49-F238E27FC236}">
-                <a16:creationId xmlns:a16="http://schemas.microsoft.com/office/drawing/2014/main" id="{919231F6-1062-A0AC-F6DD-DB7A13F3766A}"/>
+          <p:cNvPr id="11" name="Gráfico 10">
+            <a:extLst>
+              <a:ext uri="{FF2B5EF4-FFF2-40B4-BE49-F238E27FC236}">
+                <a16:creationId xmlns:a16="http://schemas.microsoft.com/office/drawing/2014/main" id="{3A8D3296-8619-42F0-0C0C-D4ECB21D138A}"/>
               </a:ext>
             </a:extLst>
           </p:cNvPr>
@@ -5612,7 +5649,7 @@
           </p:cNvPicPr>
           <p:nvPr/>
         </p:nvPicPr>
-        <p:blipFill rotWithShape="1">
+        <p:blipFill>
           <a:blip r:embed="rId2">
             <a:extLst>
               <a:ext uri="{28A0092B-C50C-407E-A947-70E740481C1C}">
@@ -5623,58 +5660,20 @@
               </a:ext>
             </a:extLst>
           </a:blip>
-          <a:srcRect l="5607" t="11338" r="9735" b="3246"/>
-          <a:stretch/>
+          <a:stretch>
+            <a:fillRect/>
+          </a:stretch>
         </p:blipFill>
         <p:spPr>
           <a:xfrm>
-            <a:off x="5364481" y="1825625"/>
-            <a:ext cx="5989320" cy="3625750"/>
+            <a:off x="6096000" y="1822064"/>
+            <a:ext cx="5485273" cy="3382400"/>
           </a:xfrm>
           <a:prstGeom prst="rect">
             <a:avLst/>
           </a:prstGeom>
         </p:spPr>
       </p:pic>
-      <p:sp>
-        <p:nvSpPr>
-          <p:cNvPr id="8" name="CaixaDeTexto 7">
-            <a:extLst>
-              <a:ext uri="{FF2B5EF4-FFF2-40B4-BE49-F238E27FC236}">
-                <a16:creationId xmlns:a16="http://schemas.microsoft.com/office/drawing/2014/main" id="{347181AC-D10B-BDCA-FF56-BF0D84F03CB8}"/>
-              </a:ext>
-            </a:extLst>
-          </p:cNvPr>
-          <p:cNvSpPr txBox="1"/>
-          <p:nvPr/>
-        </p:nvSpPr>
-        <p:spPr>
-          <a:xfrm>
-            <a:off x="10276064" y="1545065"/>
-            <a:ext cx="1100928" cy="276999"/>
-          </a:xfrm>
-          <a:prstGeom prst="rect">
-            <a:avLst/>
-          </a:prstGeom>
-          <a:noFill/>
-        </p:spPr>
-        <p:txBody>
-          <a:bodyPr wrap="square" rtlCol="0">
-            <a:spAutoFit/>
-          </a:bodyPr>
-          <a:lstStyle/>
-          <a:p>
-            <a:pPr algn="r"/>
-            <a:r>
-              <a:rPr lang="pt-BR" sz="1200" dirty="0">
-                <a:latin typeface="Helvetica" pitchFamily="2" charset="0"/>
-                <a:cs typeface="Arial" panose="020B0604020202020204" pitchFamily="34" charset="0"/>
-              </a:rPr>
-              <a:t>Figura 8</a:t>
-            </a:r>
-          </a:p>
-        </p:txBody>
-      </p:sp>
     </p:spTree>
     <p:extLst>
       <p:ext uri="{BB962C8B-B14F-4D97-AF65-F5344CB8AC3E}">
@@ -6028,7 +6027,7 @@
                 <a:effectLst/>
                 <a:latin typeface="Helvetica" pitchFamily="2" charset="0"/>
               </a:rPr>
-              <a:t>Anomalias, no contexto deste trabalho, são valores de despesas que não se enquadram nos agrupamentos criados pelo algoritmo. Algumas se posicionam no meio de todas as despesas de determinada empresa, não sendo os maiores valores no conjunto de despesas (Figura 9). </a:t>
+              <a:t>Anomalias, no contexto deste trabalho, são valores de despesas que não se enquadram nos agrupamentos criados pelo algoritmo. Algumas se posicionam no meio de todas as despesas de determinada empresa, não sendo os maiores valores no conjunto de despesas (Figura 10). </a:t>
             </a:r>
           </a:p>
           <a:p>
@@ -6115,8 +6114,8 @@
         </p:nvSpPr>
         <p:spPr>
           <a:xfrm>
-            <a:off x="10252872" y="1545065"/>
-            <a:ext cx="1100928" cy="276999"/>
+            <a:off x="5460731" y="1545065"/>
+            <a:ext cx="5893069" cy="276999"/>
           </a:xfrm>
           <a:prstGeom prst="rect">
             <a:avLst/>
@@ -6129,13 +6128,12 @@
           </a:bodyPr>
           <a:lstStyle/>
           <a:p>
-            <a:pPr algn="r"/>
             <a:r>
               <a:rPr lang="pt-BR" sz="1200" dirty="0">
                 <a:latin typeface="Helvetica" pitchFamily="2" charset="0"/>
                 <a:cs typeface="Arial" panose="020B0604020202020204" pitchFamily="34" charset="0"/>
               </a:rPr>
-              <a:t>Figura 9</a:t>
+              <a:t>Figura 10: Não anomalias e anomalias em 12 empresas aleatórias</a:t>
             </a:r>
           </a:p>
         </p:txBody>
@@ -6366,6 +6364,246 @@
 </p:sld>
 </file>
 
+<file path=ppt/slides/slide17.xml><?xml version="1.0" encoding="utf-8"?>
+<p:sld xmlns:a="http://schemas.openxmlformats.org/drawingml/2006/main" xmlns:r="http://schemas.openxmlformats.org/officeDocument/2006/relationships" xmlns:p="http://schemas.openxmlformats.org/presentationml/2006/main">
+  <p:cSld>
+    <p:spTree>
+      <p:nvGrpSpPr>
+        <p:cNvPr id="1" name=""/>
+        <p:cNvGrpSpPr/>
+        <p:nvPr/>
+      </p:nvGrpSpPr>
+      <p:grpSpPr>
+        <a:xfrm>
+          <a:off x="0" y="0"/>
+          <a:ext cx="0" cy="0"/>
+          <a:chOff x="0" y="0"/>
+          <a:chExt cx="0" cy="0"/>
+        </a:xfrm>
+      </p:grpSpPr>
+      <p:sp>
+        <p:nvSpPr>
+          <p:cNvPr id="2" name="Título 1">
+            <a:extLst>
+              <a:ext uri="{FF2B5EF4-FFF2-40B4-BE49-F238E27FC236}">
+                <a16:creationId xmlns:a16="http://schemas.microsoft.com/office/drawing/2014/main" id="{540F1CF0-7D3A-1F30-A06D-DD96920677D2}"/>
+              </a:ext>
+            </a:extLst>
+          </p:cNvPr>
+          <p:cNvSpPr>
+            <a:spLocks noGrp="1"/>
+          </p:cNvSpPr>
+          <p:nvPr>
+            <p:ph type="title"/>
+          </p:nvPr>
+        </p:nvSpPr>
+        <p:spPr/>
+        <p:txBody>
+          <a:bodyPr anchor="t" anchorCtr="0">
+            <a:normAutofit/>
+          </a:bodyPr>
+          <a:lstStyle/>
+          <a:p>
+            <a:pPr>
+              <a:lnSpc>
+                <a:spcPct val="100000"/>
+              </a:lnSpc>
+            </a:pPr>
+            <a:r>
+              <a:rPr lang="pt-BR" sz="2800" b="1" dirty="0">
+                <a:latin typeface="Helvetica" pitchFamily="2" charset="0"/>
+                <a:cs typeface="Arial" panose="020B0604020202020204" pitchFamily="34" charset="0"/>
+              </a:rPr>
+              <a:t>CONSIDERAÇÕES FINAIS </a:t>
+            </a:r>
+            <a:r>
+              <a:rPr lang="pt-BR" sz="2800" dirty="0">
+                <a:solidFill>
+                  <a:schemeClr val="tx1">
+                    <a:lumMod val="50000"/>
+                    <a:lumOff val="50000"/>
+                  </a:schemeClr>
+                </a:solidFill>
+                <a:latin typeface="Helvetica" pitchFamily="2" charset="0"/>
+                <a:cs typeface="Arial" panose="020B0604020202020204" pitchFamily="34" charset="0"/>
+              </a:rPr>
+              <a:t>Números finais</a:t>
+            </a:r>
+          </a:p>
+        </p:txBody>
+      </p:sp>
+      <p:sp>
+        <p:nvSpPr>
+          <p:cNvPr id="3" name="Espaço Reservado para Conteúdo 2">
+            <a:extLst>
+              <a:ext uri="{FF2B5EF4-FFF2-40B4-BE49-F238E27FC236}">
+                <a16:creationId xmlns:a16="http://schemas.microsoft.com/office/drawing/2014/main" id="{AC797752-DF14-11FD-FD02-7A6C4E7C74D2}"/>
+              </a:ext>
+            </a:extLst>
+          </p:cNvPr>
+          <p:cNvSpPr>
+            <a:spLocks noGrp="1"/>
+          </p:cNvSpPr>
+          <p:nvPr>
+            <p:ph idx="1"/>
+          </p:nvPr>
+        </p:nvSpPr>
+        <p:spPr>
+          <a:xfrm>
+            <a:off x="838199" y="1825625"/>
+            <a:ext cx="8587903" cy="4857277"/>
+          </a:xfrm>
+        </p:spPr>
+        <p:txBody>
+          <a:bodyPr>
+            <a:noAutofit/>
+          </a:bodyPr>
+          <a:lstStyle/>
+          <a:p>
+            <a:pPr marL="0" indent="0">
+              <a:lnSpc>
+                <a:spcPts val="3000"/>
+              </a:lnSpc>
+              <a:spcBef>
+                <a:spcPts val="0"/>
+              </a:spcBef>
+              <a:buNone/>
+            </a:pPr>
+            <a:r>
+              <a:rPr lang="pt-BR" sz="2000" dirty="0">
+                <a:solidFill>
+                  <a:srgbClr val="000000"/>
+                </a:solidFill>
+                <a:latin typeface="Helvetica" pitchFamily="2" charset="0"/>
+              </a:rPr>
+              <a:t>Um dos direitos garantidos em lei aos deputados estaduais, a verba de gabinete pode superar R$ 28,5 milhões em 2023. Tendo sua origem nos cofres públicos, cabe aos órgãos de controle estaduais a observância de seu uso para coibir eventual malversação dos recursos.</a:t>
+            </a:r>
+          </a:p>
+          <a:p>
+            <a:pPr marL="0" indent="0">
+              <a:lnSpc>
+                <a:spcPts val="3000"/>
+              </a:lnSpc>
+              <a:spcBef>
+                <a:spcPts val="0"/>
+              </a:spcBef>
+              <a:buNone/>
+            </a:pPr>
+            <a:endParaRPr lang="pt-BR" sz="2000" dirty="0">
+              <a:solidFill>
+                <a:srgbClr val="000000"/>
+              </a:solidFill>
+              <a:latin typeface="Helvetica" pitchFamily="2" charset="0"/>
+            </a:endParaRPr>
+          </a:p>
+          <a:p>
+            <a:pPr marL="0" indent="0">
+              <a:lnSpc>
+                <a:spcPts val="3000"/>
+              </a:lnSpc>
+              <a:spcBef>
+                <a:spcPts val="0"/>
+              </a:spcBef>
+              <a:buNone/>
+            </a:pPr>
+            <a:r>
+              <a:rPr lang="pt-BR" sz="2000" dirty="0">
+                <a:solidFill>
+                  <a:srgbClr val="000000"/>
+                </a:solidFill>
+                <a:latin typeface="Helvetica" pitchFamily="2" charset="0"/>
+              </a:rPr>
+              <a:t>Técnicas de aprendizado de máquina como clusterização por K-</a:t>
+            </a:r>
+            <a:r>
+              <a:rPr lang="pt-BR" sz="2000" dirty="0" err="1">
+                <a:solidFill>
+                  <a:srgbClr val="000000"/>
+                </a:solidFill>
+                <a:latin typeface="Helvetica" pitchFamily="2" charset="0"/>
+              </a:rPr>
+              <a:t>Means</a:t>
+            </a:r>
+            <a:r>
+              <a:rPr lang="pt-BR" sz="2000" dirty="0">
+                <a:solidFill>
+                  <a:srgbClr val="000000"/>
+                </a:solidFill>
+                <a:latin typeface="Helvetica" pitchFamily="2" charset="0"/>
+              </a:rPr>
+              <a:t> podem auxiliar nessa tarefa. Este trabalho apresentou um algoritmo com métodos robustos, que foi capaz de trazer resultados: 46 despesas efetuadas entre 2018 e 2022 foram consideradas anomalias. </a:t>
+            </a:r>
+          </a:p>
+          <a:p>
+            <a:pPr marL="0" indent="0">
+              <a:lnSpc>
+                <a:spcPts val="3000"/>
+              </a:lnSpc>
+              <a:spcBef>
+                <a:spcPts val="0"/>
+              </a:spcBef>
+              <a:buNone/>
+            </a:pPr>
+            <a:endParaRPr lang="pt-BR" sz="2000" dirty="0">
+              <a:solidFill>
+                <a:srgbClr val="000000"/>
+              </a:solidFill>
+              <a:latin typeface="Helvetica" pitchFamily="2" charset="0"/>
+            </a:endParaRPr>
+          </a:p>
+          <a:p>
+            <a:pPr marL="0" indent="0">
+              <a:lnSpc>
+                <a:spcPts val="3000"/>
+              </a:lnSpc>
+              <a:spcBef>
+                <a:spcPts val="0"/>
+              </a:spcBef>
+              <a:buNone/>
+            </a:pPr>
+            <a:r>
+              <a:rPr lang="pt-BR" sz="2000" dirty="0">
+                <a:solidFill>
+                  <a:srgbClr val="000000"/>
+                </a:solidFill>
+                <a:latin typeface="Helvetica" pitchFamily="2" charset="0"/>
+              </a:rPr>
+              <a:t>Posta à luz de métodos consagrados de validação, a performance do algoritmo autoral se mostrou sólida. </a:t>
+            </a:r>
+          </a:p>
+          <a:p>
+            <a:pPr marL="0" indent="0">
+              <a:lnSpc>
+                <a:spcPts val="3000"/>
+              </a:lnSpc>
+              <a:spcBef>
+                <a:spcPts val="0"/>
+              </a:spcBef>
+              <a:buNone/>
+            </a:pPr>
+            <a:endParaRPr lang="pt-BR" sz="2000" b="0" i="0" u="none" strike="noStrike" dirty="0">
+              <a:solidFill>
+                <a:srgbClr val="000000"/>
+              </a:solidFill>
+              <a:effectLst/>
+              <a:latin typeface="Helvetica" pitchFamily="2" charset="0"/>
+            </a:endParaRPr>
+          </a:p>
+        </p:txBody>
+      </p:sp>
+    </p:spTree>
+    <p:extLst>
+      <p:ext uri="{BB962C8B-B14F-4D97-AF65-F5344CB8AC3E}">
+        <p14:creationId xmlns:p14="http://schemas.microsoft.com/office/powerpoint/2010/main" val="2605425823"/>
+      </p:ext>
+    </p:extLst>
+  </p:cSld>
+  <p:clrMapOvr>
+    <a:masterClrMapping/>
+  </p:clrMapOvr>
+</p:sld>
+</file>
+
 <file path=ppt/slides/slide2.xml><?xml version="1.0" encoding="utf-8"?>
 <p:sld xmlns:a="http://schemas.openxmlformats.org/drawingml/2006/main" xmlns:r="http://schemas.openxmlformats.org/officeDocument/2006/relationships" xmlns:p="http://schemas.openxmlformats.org/presentationml/2006/main">
   <p:cSld>
@@ -7133,7 +7371,7 @@
                 <a:latin typeface="Helvetica" pitchFamily="2" charset="0"/>
                 <a:cs typeface="Arial" panose="020B0604020202020204" pitchFamily="34" charset="0"/>
               </a:rPr>
-              <a:t>INTRODUÇÃO </a:t>
+              <a:t>MATERIAIS E MÉTODO </a:t>
             </a:r>
             <a:r>
               <a:rPr lang="pt-BR" sz="2800" dirty="0">
@@ -7146,7 +7384,7 @@
                 <a:latin typeface="Helvetica" pitchFamily="2" charset="0"/>
                 <a:cs typeface="Arial" panose="020B0604020202020204" pitchFamily="34" charset="0"/>
               </a:rPr>
-              <a:t>Papel de ciência de dados</a:t>
+              <a:t>Recorte</a:t>
             </a:r>
           </a:p>
         </p:txBody>
@@ -7170,7 +7408,7 @@
         <p:spPr>
           <a:xfrm>
             <a:off x="838200" y="1825625"/>
-            <a:ext cx="5991808" cy="4489450"/>
+            <a:ext cx="8286345" cy="4489450"/>
           </a:xfrm>
         </p:spPr>
         <p:txBody>
@@ -7196,7 +7434,7 @@
                 <a:effectLst/>
                 <a:latin typeface="Helvetica" pitchFamily="2" charset="0"/>
               </a:rPr>
-              <a:t>Técnicas de aprendizado de máquina podem auxiliar os órgãos de controle a detectar quais das despesas efetuadas são anomalias e devem ser objetos de escrutínio pormenorizado.</a:t>
+              <a:t>Técnicas de aprendizado de máquina podem auxiliar os órgãos de controle a detectar quais das despesas efetuadas na verba de gabinete são anomalias e devem ser objetos de escrutínio pormenorizado.</a:t>
             </a:r>
           </a:p>
           <a:p>
@@ -7234,7 +7472,45 @@
                 <a:effectLst/>
                 <a:latin typeface="Helvetica" pitchFamily="2" charset="0"/>
               </a:rPr>
-              <a:t>Neste trabalho, foi utilizado um algoritmo autoral de K-</a:t>
+              <a:t>Para este trabalho, utilizou-se o conjunto de dados obtido junto ao Portal de Dados Abertos da Alesp referente ao período 2018-2022, na categoria alimentação e hospedagem. Seus valores foram corrigidos pela inflação (IPCA).</a:t>
+            </a:r>
+          </a:p>
+          <a:p>
+            <a:pPr marL="0" indent="0">
+              <a:lnSpc>
+                <a:spcPts val="3000"/>
+              </a:lnSpc>
+              <a:spcBef>
+                <a:spcPts val="0"/>
+              </a:spcBef>
+              <a:buNone/>
+            </a:pPr>
+            <a:endParaRPr lang="pt-BR" sz="2000" dirty="0">
+              <a:solidFill>
+                <a:srgbClr val="000000"/>
+              </a:solidFill>
+              <a:latin typeface="Helvetica" pitchFamily="2" charset="0"/>
+            </a:endParaRPr>
+          </a:p>
+          <a:p>
+            <a:pPr marL="0" indent="0">
+              <a:lnSpc>
+                <a:spcPts val="3000"/>
+              </a:lnSpc>
+              <a:spcBef>
+                <a:spcPts val="0"/>
+              </a:spcBef>
+              <a:buNone/>
+            </a:pPr>
+            <a:r>
+              <a:rPr lang="pt-BR" sz="2000" b="0" i="0" u="none" strike="noStrike" dirty="0">
+                <a:solidFill>
+                  <a:srgbClr val="000000"/>
+                </a:solidFill>
+                <a:effectLst/>
+                <a:latin typeface="Helvetica" pitchFamily="2" charset="0"/>
+              </a:rPr>
+              <a:t>Em seguida, os dados foram processados por um algoritmo autoral de K-</a:t>
             </a:r>
             <a:r>
               <a:rPr lang="pt-BR" sz="2000" b="0" i="0" u="none" strike="noStrike" dirty="0" err="1">
@@ -7254,7 +7530,7 @@
                 <a:effectLst/>
                 <a:latin typeface="Helvetica" pitchFamily="2" charset="0"/>
               </a:rPr>
-              <a:t> nos dados de alimentação e hospedagem de 2018 a 2022, com valores corrigidos pela inflação.</a:t>
+              <a:t>, construído com a finalidade de detectar anomalias.</a:t>
             </a:r>
           </a:p>
         </p:txBody>
@@ -7360,8 +7636,8 @@
             </p:nvSpPr>
             <p:spPr>
               <a:xfrm>
-                <a:off x="838200" y="1825625"/>
-                <a:ext cx="5257800" cy="4489450"/>
+                <a:off x="838199" y="1825625"/>
+                <a:ext cx="5751443" cy="4489450"/>
               </a:xfrm>
             </p:spPr>
             <p:txBody>
@@ -7518,7 +7794,7 @@
                     <a:effectLst/>
                     <a:latin typeface="Helvetica" pitchFamily="2" charset="0"/>
                   </a:rPr>
-                  <a:t>Cada ponto de dado pertence ao agrupamento em que haja menor distância em relação ao centro do cluster (centroide). </a:t>
+                  <a:t>Cada ponto de dado pertence ao agrupamento em que haja menor distância em relação ao centro do cluster (Figura 1). </a:t>
                 </a:r>
               </a:p>
               <a:p>
@@ -7581,13 +7857,13 @@
             </p:nvSpPr>
             <p:spPr>
               <a:xfrm>
-                <a:off x="838200" y="1825625"/>
-                <a:ext cx="5257800" cy="4489450"/>
+                <a:off x="838199" y="1825625"/>
+                <a:ext cx="5751443" cy="4489450"/>
               </a:xfrm>
               <a:blipFill>
                 <a:blip r:embed="rId2"/>
                 <a:stretch>
-                  <a:fillRect l="-1276" r="-464" b="-5292"/>
+                  <a:fillRect l="-1059" r="-2225" b="-5292"/>
                 </a:stretch>
               </a:blipFill>
             </p:spPr>
@@ -7606,583 +7882,66 @@
           </p:sp>
         </mc:Fallback>
       </mc:AlternateContent>
-      <mc:AlternateContent xmlns:mc="http://schemas.openxmlformats.org/markup-compatibility/2006" xmlns:a14="http://schemas.microsoft.com/office/drawing/2010/main">
-        <mc:Choice Requires="a14">
-          <p:sp>
-            <p:nvSpPr>
-              <p:cNvPr id="4" name="CaixaDeTexto 3">
-                <a:extLst>
-                  <a:ext uri="{FF2B5EF4-FFF2-40B4-BE49-F238E27FC236}">
-                    <a16:creationId xmlns:a16="http://schemas.microsoft.com/office/drawing/2014/main" id="{ECA1C27A-88E9-1B3F-9154-854C731DF4E6}"/>
-                  </a:ext>
-                </a:extLst>
-              </p:cNvPr>
-              <p:cNvSpPr txBox="1"/>
-              <p:nvPr/>
-            </p:nvSpPr>
-            <p:spPr>
-              <a:xfrm>
-                <a:off x="6452681" y="1825625"/>
-                <a:ext cx="4901119" cy="3902287"/>
-              </a:xfrm>
-              <a:prstGeom prst="rect">
-                <a:avLst/>
-              </a:prstGeom>
-              <a:solidFill>
-                <a:schemeClr val="bg1">
-                  <a:lumMod val="95000"/>
-                </a:schemeClr>
-              </a:solidFill>
-              <a:ln w="19050">
-                <a:solidFill>
-                  <a:schemeClr val="tx1"/>
-                </a:solidFill>
-              </a:ln>
-            </p:spPr>
-            <p:txBody>
-              <a:bodyPr wrap="square" lIns="180000" rIns="180000" rtlCol="0">
-                <a:spAutoFit/>
-              </a:bodyPr>
-              <a:lstStyle/>
-              <a:p>
-                <a:pPr algn="ctr">
-                  <a:lnSpc>
-                    <a:spcPts val="3000"/>
-                  </a:lnSpc>
-                </a:pPr>
-                <a:endParaRPr lang="pt-BR" sz="2000" dirty="0">
-                  <a:latin typeface="Helvetica" pitchFamily="2" charset="0"/>
-                  <a:cs typeface="Arial" panose="020B0604020202020204" pitchFamily="34" charset="0"/>
-                </a:endParaRPr>
-              </a:p>
-              <a:p>
-                <a:pPr algn="ctr">
-                  <a:lnSpc>
-                    <a:spcPts val="3000"/>
-                  </a:lnSpc>
-                </a:pPr>
-                <a:endParaRPr lang="pt-BR" sz="2000" dirty="0">
-                  <a:latin typeface="Helvetica" pitchFamily="2" charset="0"/>
-                  <a:cs typeface="Arial" panose="020B0604020202020204" pitchFamily="34" charset="0"/>
-                </a:endParaRPr>
-              </a:p>
-              <a:p>
-                <a:pPr algn="ctr">
-                  <a:lnSpc>
-                    <a:spcPts val="3000"/>
-                  </a:lnSpc>
-                </a:pPr>
-                <a14:m>
-                  <m:oMathPara xmlns:m="http://schemas.openxmlformats.org/officeDocument/2006/math">
-                    <m:oMathParaPr>
-                      <m:jc m:val="centerGroup"/>
-                    </m:oMathParaPr>
-                    <m:oMath xmlns:m="http://schemas.openxmlformats.org/officeDocument/2006/math">
-                      <m:nary>
-                        <m:naryPr>
-                          <m:chr m:val="∑"/>
-                          <m:ctrlPr>
-                            <a:rPr lang="pt-BR" sz="2000" i="1" smtClean="0">
-                              <a:latin typeface="Cambria Math" panose="02040503050406030204" pitchFamily="18" charset="0"/>
-                              <a:cs typeface="Arial" panose="020B0604020202020204" pitchFamily="34" charset="0"/>
-                            </a:rPr>
-                          </m:ctrlPr>
-                        </m:naryPr>
-                        <m:sub>
-                          <m:r>
-                            <m:rPr>
-                              <m:brk m:alnAt="23"/>
-                            </m:rPr>
-                            <a:rPr lang="pt-BR" sz="2000" b="0" i="1" smtClean="0">
-                              <a:latin typeface="Cambria Math" panose="02040503050406030204" pitchFamily="18" charset="0"/>
-                              <a:cs typeface="Arial" panose="020B0604020202020204" pitchFamily="34" charset="0"/>
-                            </a:rPr>
-                            <m:t>𝑖</m:t>
-                          </m:r>
-                          <m:r>
-                            <a:rPr lang="pt-BR" sz="2000" b="0" i="1" smtClean="0">
-                              <a:latin typeface="Cambria Math" panose="02040503050406030204" pitchFamily="18" charset="0"/>
-                              <a:cs typeface="Arial" panose="020B0604020202020204" pitchFamily="34" charset="0"/>
-                            </a:rPr>
-                            <m:t>=1</m:t>
-                          </m:r>
-                        </m:sub>
-                        <m:sup>
-                          <m:r>
-                            <a:rPr lang="pt-BR" sz="2000" b="0" i="1" smtClean="0">
-                              <a:latin typeface="Cambria Math" panose="02040503050406030204" pitchFamily="18" charset="0"/>
-                              <a:cs typeface="Arial" panose="020B0604020202020204" pitchFamily="34" charset="0"/>
-                            </a:rPr>
-                            <m:t>𝑘</m:t>
-                          </m:r>
-                        </m:sup>
-                        <m:e>
-                          <m:nary>
-                            <m:naryPr>
-                              <m:chr m:val="∑"/>
-                              <m:supHide m:val="on"/>
-                              <m:ctrlPr>
-                                <a:rPr lang="pt-BR" sz="2000" i="1" smtClean="0">
-                                  <a:latin typeface="Cambria Math" panose="02040503050406030204" pitchFamily="18" charset="0"/>
-                                  <a:cs typeface="Arial" panose="020B0604020202020204" pitchFamily="34" charset="0"/>
-                                </a:rPr>
-                              </m:ctrlPr>
-                            </m:naryPr>
-                            <m:sub>
-                              <m:r>
-                                <m:rPr>
-                                  <m:brk m:alnAt="7"/>
-                                </m:rPr>
-                                <a:rPr lang="pt-BR" sz="2000" b="0" i="1" smtClean="0">
-                                  <a:latin typeface="Cambria Math" panose="02040503050406030204" pitchFamily="18" charset="0"/>
-                                  <a:cs typeface="Arial" panose="020B0604020202020204" pitchFamily="34" charset="0"/>
-                                </a:rPr>
-                                <m:t>𝑥</m:t>
-                              </m:r>
-                              <m:r>
-                                <a:rPr lang="pt-BR" sz="2000" b="0" i="1" smtClean="0">
-                                  <a:latin typeface="Cambria Math" panose="02040503050406030204" pitchFamily="18" charset="0"/>
-                                  <a:ea typeface="Cambria Math" panose="02040503050406030204" pitchFamily="18" charset="0"/>
-                                  <a:cs typeface="Arial" panose="020B0604020202020204" pitchFamily="34" charset="0"/>
-                                </a:rPr>
-                                <m:t>∈</m:t>
-                              </m:r>
-                              <m:sSub>
-                                <m:sSubPr>
-                                  <m:ctrlPr>
-                                    <a:rPr lang="pt-BR" sz="2000" b="0" i="1" smtClean="0">
-                                      <a:latin typeface="Cambria Math" panose="02040503050406030204" pitchFamily="18" charset="0"/>
-                                      <a:ea typeface="Cambria Math" panose="02040503050406030204" pitchFamily="18" charset="0"/>
-                                      <a:cs typeface="Arial" panose="020B0604020202020204" pitchFamily="34" charset="0"/>
-                                    </a:rPr>
-                                  </m:ctrlPr>
-                                </m:sSubPr>
-                                <m:e>
-                                  <m:r>
-                                    <a:rPr lang="pt-BR" sz="2000" b="0" i="1" smtClean="0">
-                                      <a:latin typeface="Cambria Math" panose="02040503050406030204" pitchFamily="18" charset="0"/>
-                                      <a:ea typeface="Cambria Math" panose="02040503050406030204" pitchFamily="18" charset="0"/>
-                                      <a:cs typeface="Arial" panose="020B0604020202020204" pitchFamily="34" charset="0"/>
-                                    </a:rPr>
-                                    <m:t>𝑆</m:t>
-                                  </m:r>
-                                </m:e>
-                                <m:sub>
-                                  <m:r>
-                                    <a:rPr lang="pt-BR" sz="2000" b="0" i="1" smtClean="0">
-                                      <a:latin typeface="Cambria Math" panose="02040503050406030204" pitchFamily="18" charset="0"/>
-                                      <a:ea typeface="Cambria Math" panose="02040503050406030204" pitchFamily="18" charset="0"/>
-                                      <a:cs typeface="Arial" panose="020B0604020202020204" pitchFamily="34" charset="0"/>
-                                    </a:rPr>
-                                    <m:t>𝑖</m:t>
-                                  </m:r>
-                                </m:sub>
-                              </m:sSub>
-                            </m:sub>
-                            <m:sup/>
-                            <m:e>
-                              <m:sSup>
-                                <m:sSupPr>
-                                  <m:ctrlPr>
-                                    <a:rPr lang="pt-BR" sz="2000" i="1" smtClean="0">
-                                      <a:latin typeface="Cambria Math" panose="02040503050406030204" pitchFamily="18" charset="0"/>
-                                      <a:cs typeface="Arial" panose="020B0604020202020204" pitchFamily="34" charset="0"/>
-                                    </a:rPr>
-                                  </m:ctrlPr>
-                                </m:sSupPr>
-                                <m:e>
-                                  <m:r>
-                                    <a:rPr lang="pt-BR" sz="2000" i="1" smtClean="0">
-                                      <a:latin typeface="Cambria Math" panose="02040503050406030204" pitchFamily="18" charset="0"/>
-                                      <a:ea typeface="Cambria Math" panose="02040503050406030204" pitchFamily="18" charset="0"/>
-                                      <a:cs typeface="Arial" panose="020B0604020202020204" pitchFamily="34" charset="0"/>
-                                    </a:rPr>
-                                    <m:t>∥</m:t>
-                                  </m:r>
-                                  <m:r>
-                                    <a:rPr lang="pt-BR" sz="2000" b="0" i="1" smtClean="0">
-                                      <a:latin typeface="Cambria Math" panose="02040503050406030204" pitchFamily="18" charset="0"/>
-                                      <a:ea typeface="Cambria Math" panose="02040503050406030204" pitchFamily="18" charset="0"/>
-                                      <a:cs typeface="Arial" panose="020B0604020202020204" pitchFamily="34" charset="0"/>
-                                    </a:rPr>
-                                    <m:t>𝑥</m:t>
-                                  </m:r>
-                                  <m:r>
-                                    <a:rPr lang="pt-BR" sz="2000" b="0" i="1" smtClean="0">
-                                      <a:latin typeface="Cambria Math" panose="02040503050406030204" pitchFamily="18" charset="0"/>
-                                      <a:ea typeface="Cambria Math" panose="02040503050406030204" pitchFamily="18" charset="0"/>
-                                      <a:cs typeface="Arial" panose="020B0604020202020204" pitchFamily="34" charset="0"/>
-                                    </a:rPr>
-                                    <m:t>−</m:t>
-                                  </m:r>
-                                  <m:sSub>
-                                    <m:sSubPr>
-                                      <m:ctrlPr>
-                                        <a:rPr lang="pt-BR" sz="2000" b="0" i="1" smtClean="0">
-                                          <a:latin typeface="Cambria Math" panose="02040503050406030204" pitchFamily="18" charset="0"/>
-                                          <a:ea typeface="Cambria Math" panose="02040503050406030204" pitchFamily="18" charset="0"/>
-                                          <a:cs typeface="Arial" panose="020B0604020202020204" pitchFamily="34" charset="0"/>
-                                        </a:rPr>
-                                      </m:ctrlPr>
-                                    </m:sSubPr>
-                                    <m:e>
-                                      <m:r>
-                                        <a:rPr lang="pt-BR" sz="2000" b="0" i="1" smtClean="0">
-                                          <a:latin typeface="Cambria Math" panose="02040503050406030204" pitchFamily="18" charset="0"/>
-                                          <a:ea typeface="Cambria Math" panose="02040503050406030204" pitchFamily="18" charset="0"/>
-                                          <a:cs typeface="Arial" panose="020B0604020202020204" pitchFamily="34" charset="0"/>
-                                        </a:rPr>
-                                        <m:t>𝜇</m:t>
-                                      </m:r>
-                                    </m:e>
-                                    <m:sub>
-                                      <m:r>
-                                        <a:rPr lang="pt-BR" sz="2000" b="0" i="1" smtClean="0">
-                                          <a:latin typeface="Cambria Math" panose="02040503050406030204" pitchFamily="18" charset="0"/>
-                                          <a:ea typeface="Cambria Math" panose="02040503050406030204" pitchFamily="18" charset="0"/>
-                                          <a:cs typeface="Arial" panose="020B0604020202020204" pitchFamily="34" charset="0"/>
-                                        </a:rPr>
-                                        <m:t>𝑖</m:t>
-                                      </m:r>
-                                    </m:sub>
-                                  </m:sSub>
-                                  <m:r>
-                                    <a:rPr lang="pt-BR" sz="2000" b="0" i="1" smtClean="0">
-                                      <a:latin typeface="Cambria Math" panose="02040503050406030204" pitchFamily="18" charset="0"/>
-                                      <a:ea typeface="Cambria Math" panose="02040503050406030204" pitchFamily="18" charset="0"/>
-                                      <a:cs typeface="Arial" panose="020B0604020202020204" pitchFamily="34" charset="0"/>
-                                    </a:rPr>
-                                    <m:t>∥</m:t>
-                                  </m:r>
-                                </m:e>
-                                <m:sup>
-                                  <m:r>
-                                    <a:rPr lang="pt-BR" sz="2000" b="0" i="1" smtClean="0">
-                                      <a:latin typeface="Cambria Math" panose="02040503050406030204" pitchFamily="18" charset="0"/>
-                                      <a:cs typeface="Arial" panose="020B0604020202020204" pitchFamily="34" charset="0"/>
-                                    </a:rPr>
-                                    <m:t>2</m:t>
-                                  </m:r>
-                                </m:sup>
-                              </m:sSup>
-                            </m:e>
-                          </m:nary>
-                        </m:e>
-                      </m:nary>
-                    </m:oMath>
-                  </m:oMathPara>
-                </a14:m>
-                <a:endParaRPr lang="pt-BR" sz="2000" dirty="0">
-                  <a:latin typeface="Helvetica" pitchFamily="2" charset="0"/>
-                  <a:cs typeface="Arial" panose="020B0604020202020204" pitchFamily="34" charset="0"/>
-                </a:endParaRPr>
-              </a:p>
-              <a:p>
-                <a:pPr>
-                  <a:lnSpc>
-                    <a:spcPts val="3000"/>
-                  </a:lnSpc>
-                </a:pPr>
-                <a:endParaRPr lang="pt-BR" sz="2000" dirty="0">
-                  <a:latin typeface="Helvetica" pitchFamily="2" charset="0"/>
-                  <a:cs typeface="Arial" panose="020B0604020202020204" pitchFamily="34" charset="0"/>
-                </a:endParaRPr>
-              </a:p>
-              <a:p>
-                <a:pPr>
-                  <a:lnSpc>
-                    <a:spcPts val="3000"/>
-                  </a:lnSpc>
-                </a:pPr>
-                <a:r>
-                  <a:rPr lang="pt-BR" sz="2000" dirty="0">
-                    <a:latin typeface="Helvetica" pitchFamily="2" charset="0"/>
-                    <a:cs typeface="Arial" panose="020B0604020202020204" pitchFamily="34" charset="0"/>
-                  </a:rPr>
-                  <a:t>onde,</a:t>
-                </a:r>
-              </a:p>
-              <a:p>
-                <a:pPr>
-                  <a:lnSpc>
-                    <a:spcPts val="3000"/>
-                  </a:lnSpc>
-                </a:pPr>
-                <a14:m>
-                  <m:oMath xmlns:m="http://schemas.openxmlformats.org/officeDocument/2006/math">
-                    <m:r>
-                      <a:rPr lang="pt-BR" sz="2000" b="0" i="1" smtClean="0">
-                        <a:latin typeface="Cambria Math" panose="02040503050406030204" pitchFamily="18" charset="0"/>
-                        <a:cs typeface="Arial" panose="020B0604020202020204" pitchFamily="34" charset="0"/>
-                      </a:rPr>
-                      <m:t>𝑘</m:t>
-                    </m:r>
-                  </m:oMath>
-                </a14:m>
-                <a:r>
-                  <a:rPr lang="pt-BR" sz="2000" dirty="0">
-                    <a:latin typeface="Helvetica" pitchFamily="2" charset="0"/>
-                    <a:cs typeface="Arial" panose="020B0604020202020204" pitchFamily="34" charset="0"/>
-                  </a:rPr>
-                  <a:t>: número de clusters</a:t>
-                </a:r>
-              </a:p>
-              <a:p>
-                <a:pPr>
-                  <a:lnSpc>
-                    <a:spcPts val="3000"/>
-                  </a:lnSpc>
-                </a:pPr>
-                <a14:m>
-                  <m:oMath xmlns:m="http://schemas.openxmlformats.org/officeDocument/2006/math">
-                    <m:sSub>
-                      <m:sSubPr>
-                        <m:ctrlPr>
-                          <a:rPr lang="pt-BR" sz="2000" i="1" smtClean="0">
-                            <a:latin typeface="Cambria Math" panose="02040503050406030204" pitchFamily="18" charset="0"/>
-                            <a:cs typeface="Arial" panose="020B0604020202020204" pitchFamily="34" charset="0"/>
-                          </a:rPr>
-                        </m:ctrlPr>
-                      </m:sSubPr>
-                      <m:e>
-                        <m:r>
-                          <a:rPr lang="pt-BR" sz="2000" b="0" i="1" smtClean="0">
-                            <a:latin typeface="Cambria Math" panose="02040503050406030204" pitchFamily="18" charset="0"/>
-                            <a:cs typeface="Arial" panose="020B0604020202020204" pitchFamily="34" charset="0"/>
-                          </a:rPr>
-                          <m:t>𝑆</m:t>
-                        </m:r>
-                      </m:e>
-                      <m:sub>
-                        <m:r>
-                          <a:rPr lang="pt-BR" sz="2000" b="0" i="1" smtClean="0">
-                            <a:latin typeface="Cambria Math" panose="02040503050406030204" pitchFamily="18" charset="0"/>
-                            <a:cs typeface="Arial" panose="020B0604020202020204" pitchFamily="34" charset="0"/>
-                          </a:rPr>
-                          <m:t>𝑖</m:t>
-                        </m:r>
-                      </m:sub>
-                    </m:sSub>
-                  </m:oMath>
-                </a14:m>
-                <a:r>
-                  <a:rPr lang="pt-BR" sz="2000" dirty="0">
-                    <a:latin typeface="Helvetica" pitchFamily="2" charset="0"/>
-                    <a:cs typeface="Arial" panose="020B0604020202020204" pitchFamily="34" charset="0"/>
-                  </a:rPr>
-                  <a:t>: cluster </a:t>
-                </a:r>
-                <a14:m>
-                  <m:oMath xmlns:m="http://schemas.openxmlformats.org/officeDocument/2006/math">
-                    <m:r>
-                      <a:rPr lang="pt-BR" sz="2000" b="0" i="1" smtClean="0">
-                        <a:latin typeface="Cambria Math" panose="02040503050406030204" pitchFamily="18" charset="0"/>
-                        <a:cs typeface="Arial" panose="020B0604020202020204" pitchFamily="34" charset="0"/>
-                      </a:rPr>
-                      <m:t>𝑖</m:t>
-                    </m:r>
-                  </m:oMath>
-                </a14:m>
-                <a:endParaRPr lang="pt-BR" sz="2000" dirty="0">
-                  <a:latin typeface="Helvetica" pitchFamily="2" charset="0"/>
-                  <a:cs typeface="Arial" panose="020B0604020202020204" pitchFamily="34" charset="0"/>
-                </a:endParaRPr>
-              </a:p>
-              <a:p>
-                <a:pPr>
-                  <a:lnSpc>
-                    <a:spcPts val="3000"/>
-                  </a:lnSpc>
-                </a:pPr>
-                <a14:m>
-                  <m:oMath xmlns:m="http://schemas.openxmlformats.org/officeDocument/2006/math">
-                    <m:r>
-                      <a:rPr lang="pt-BR" sz="2000" b="0" i="1" smtClean="0">
-                        <a:latin typeface="Cambria Math" panose="02040503050406030204" pitchFamily="18" charset="0"/>
-                        <a:cs typeface="Arial" panose="020B0604020202020204" pitchFamily="34" charset="0"/>
-                      </a:rPr>
-                      <m:t>𝑥</m:t>
-                    </m:r>
-                  </m:oMath>
-                </a14:m>
-                <a:r>
-                  <a:rPr lang="pt-BR" sz="2000" dirty="0">
-                    <a:latin typeface="Helvetica" pitchFamily="2" charset="0"/>
-                    <a:cs typeface="Arial" panose="020B0604020202020204" pitchFamily="34" charset="0"/>
-                  </a:rPr>
-                  <a:t>: ponto de dado</a:t>
-                </a:r>
-              </a:p>
-              <a:p>
-                <a:pPr>
-                  <a:lnSpc>
-                    <a:spcPts val="3000"/>
-                  </a:lnSpc>
-                </a:pPr>
-                <a14:m>
-                  <m:oMath xmlns:m="http://schemas.openxmlformats.org/officeDocument/2006/math">
-                    <m:sSub>
-                      <m:sSubPr>
-                        <m:ctrlPr>
-                          <a:rPr lang="pt-BR" sz="2000" i="1" smtClean="0">
-                            <a:latin typeface="Cambria Math" panose="02040503050406030204" pitchFamily="18" charset="0"/>
-                            <a:cs typeface="Arial" panose="020B0604020202020204" pitchFamily="34" charset="0"/>
-                          </a:rPr>
-                        </m:ctrlPr>
-                      </m:sSubPr>
-                      <m:e>
-                        <m:r>
-                          <a:rPr lang="pt-BR" sz="2000" i="1" smtClean="0">
-                            <a:latin typeface="Cambria Math" panose="02040503050406030204" pitchFamily="18" charset="0"/>
-                            <a:ea typeface="Cambria Math" panose="02040503050406030204" pitchFamily="18" charset="0"/>
-                            <a:cs typeface="Arial" panose="020B0604020202020204" pitchFamily="34" charset="0"/>
-                          </a:rPr>
-                          <m:t>𝜇</m:t>
-                        </m:r>
-                      </m:e>
-                      <m:sub>
-                        <m:r>
-                          <a:rPr lang="pt-BR" sz="2000" b="0" i="1" smtClean="0">
-                            <a:latin typeface="Cambria Math" panose="02040503050406030204" pitchFamily="18" charset="0"/>
-                            <a:cs typeface="Arial" panose="020B0604020202020204" pitchFamily="34" charset="0"/>
-                          </a:rPr>
-                          <m:t>𝑖</m:t>
-                        </m:r>
-                      </m:sub>
-                    </m:sSub>
-                  </m:oMath>
-                </a14:m>
-                <a:r>
-                  <a:rPr lang="pt-BR" sz="2000" dirty="0">
-                    <a:latin typeface="Helvetica" pitchFamily="2" charset="0"/>
-                    <a:cs typeface="Arial" panose="020B0604020202020204" pitchFamily="34" charset="0"/>
-                  </a:rPr>
-                  <a:t>: média da distância dos pontos em </a:t>
-                </a:r>
-                <a14:m>
-                  <m:oMath xmlns:m="http://schemas.openxmlformats.org/officeDocument/2006/math">
-                    <m:sSub>
-                      <m:sSubPr>
-                        <m:ctrlPr>
-                          <a:rPr lang="pt-BR" sz="2000" i="1" smtClean="0">
-                            <a:latin typeface="Cambria Math" panose="02040503050406030204" pitchFamily="18" charset="0"/>
-                            <a:cs typeface="Arial" panose="020B0604020202020204" pitchFamily="34" charset="0"/>
-                          </a:rPr>
-                        </m:ctrlPr>
-                      </m:sSubPr>
-                      <m:e>
-                        <m:r>
-                          <a:rPr lang="pt-BR" sz="2000" b="0" i="1" smtClean="0">
-                            <a:latin typeface="Cambria Math" panose="02040503050406030204" pitchFamily="18" charset="0"/>
-                            <a:cs typeface="Arial" panose="020B0604020202020204" pitchFamily="34" charset="0"/>
-                          </a:rPr>
-                          <m:t>𝑆</m:t>
-                        </m:r>
-                      </m:e>
-                      <m:sub>
-                        <m:r>
-                          <a:rPr lang="pt-BR" sz="2000" b="0" i="1" smtClean="0">
-                            <a:latin typeface="Cambria Math" panose="02040503050406030204" pitchFamily="18" charset="0"/>
-                            <a:cs typeface="Arial" panose="020B0604020202020204" pitchFamily="34" charset="0"/>
-                          </a:rPr>
-                          <m:t>𝑖</m:t>
-                        </m:r>
-                      </m:sub>
-                    </m:sSub>
-                  </m:oMath>
-                </a14:m>
-                <a:endParaRPr lang="pt-BR" sz="2000" dirty="0">
-                  <a:latin typeface="Helvetica" pitchFamily="2" charset="0"/>
-                  <a:cs typeface="Arial" panose="020B0604020202020204" pitchFamily="34" charset="0"/>
-                </a:endParaRPr>
-              </a:p>
-              <a:p>
-                <a:pPr>
-                  <a:lnSpc>
-                    <a:spcPts val="3000"/>
-                  </a:lnSpc>
-                </a:pPr>
-                <a:endParaRPr lang="pt-BR" sz="2000" dirty="0">
-                  <a:latin typeface="Helvetica" pitchFamily="2" charset="0"/>
-                  <a:cs typeface="Arial" panose="020B0604020202020204" pitchFamily="34" charset="0"/>
-                </a:endParaRPr>
-              </a:p>
-            </p:txBody>
-          </p:sp>
-        </mc:Choice>
-        <mc:Fallback xmlns="">
-          <p:sp>
-            <p:nvSpPr>
-              <p:cNvPr id="4" name="CaixaDeTexto 3">
-                <a:extLst>
-                  <a:ext uri="{FF2B5EF4-FFF2-40B4-BE49-F238E27FC236}">
-                    <a16:creationId xmlns:a16="http://schemas.microsoft.com/office/drawing/2014/main" id="{ECA1C27A-88E9-1B3F-9154-854C731DF4E6}"/>
-                  </a:ext>
-                </a:extLst>
-              </p:cNvPr>
-              <p:cNvSpPr txBox="1">
-                <a:spLocks noRot="1" noChangeAspect="1" noMove="1" noResize="1" noEditPoints="1" noAdjustHandles="1" noChangeArrowheads="1" noChangeShapeType="1" noTextEdit="1"/>
-              </p:cNvSpPr>
-              <p:nvPr/>
-            </p:nvSpPr>
-            <p:spPr>
-              <a:xfrm>
-                <a:off x="6452681" y="1825625"/>
-                <a:ext cx="4901119" cy="3902287"/>
-              </a:xfrm>
-              <a:prstGeom prst="rect">
-                <a:avLst/>
-              </a:prstGeom>
-              <a:blipFill>
-                <a:blip r:embed="rId3"/>
-                <a:stretch>
-                  <a:fillRect t="-14907"/>
-                </a:stretch>
-              </a:blipFill>
-              <a:ln w="19050">
-                <a:solidFill>
-                  <a:schemeClr val="tx1"/>
-                </a:solidFill>
-              </a:ln>
-            </p:spPr>
-            <p:txBody>
-              <a:bodyPr/>
-              <a:lstStyle/>
-              <a:p>
-                <a:r>
-                  <a:rPr lang="pt-BR">
-                    <a:noFill/>
-                  </a:rPr>
-                  <a:t> </a:t>
-                </a:r>
-              </a:p>
-            </p:txBody>
-          </p:sp>
-        </mc:Fallback>
-      </mc:AlternateContent>
-      <p:sp>
-        <p:nvSpPr>
-          <p:cNvPr id="5" name="CaixaDeTexto 4">
-            <a:extLst>
-              <a:ext uri="{FF2B5EF4-FFF2-40B4-BE49-F238E27FC236}">
-                <a16:creationId xmlns:a16="http://schemas.microsoft.com/office/drawing/2014/main" id="{2EEC734D-2E9A-ADF0-C47C-41546FE9041D}"/>
-              </a:ext>
-            </a:extLst>
-          </p:cNvPr>
-          <p:cNvSpPr txBox="1"/>
+      <p:pic>
+        <p:nvPicPr>
+          <p:cNvPr id="7" name="Gráfico 6">
+            <a:extLst>
+              <a:ext uri="{FF2B5EF4-FFF2-40B4-BE49-F238E27FC236}">
+                <a16:creationId xmlns:a16="http://schemas.microsoft.com/office/drawing/2014/main" id="{C4574686-B1DB-AFAC-4070-FD8D6B022D5D}"/>
+              </a:ext>
+            </a:extLst>
+          </p:cNvPr>
+          <p:cNvPicPr>
+            <a:picLocks noChangeAspect="1"/>
+          </p:cNvPicPr>
           <p:nvPr/>
-        </p:nvSpPr>
+        </p:nvPicPr>
+        <p:blipFill>
+          <a:blip r:embed="rId3">
+            <a:extLst>
+              <a:ext uri="{28A0092B-C50C-407E-A947-70E740481C1C}">
+                <a14:useLocalDpi xmlns:a14="http://schemas.microsoft.com/office/drawing/2010/main" val="0"/>
+              </a:ext>
+              <a:ext uri="{96DAC541-7B7A-43D3-8B79-37D633B846F1}">
+                <asvg:svgBlip xmlns:asvg="http://schemas.microsoft.com/office/drawing/2016/SVG/main" r:embed="rId4"/>
+              </a:ext>
+            </a:extLst>
+          </a:blip>
+          <a:stretch>
+            <a:fillRect/>
+          </a:stretch>
+        </p:blipFill>
         <p:spPr>
           <a:xfrm>
-            <a:off x="8152976" y="1690688"/>
-            <a:ext cx="1500528" cy="400110"/>
+            <a:off x="7454348" y="1690688"/>
+            <a:ext cx="4089812" cy="3143959"/>
           </a:xfrm>
           <a:prstGeom prst="rect">
             <a:avLst/>
           </a:prstGeom>
-          <a:solidFill>
-            <a:schemeClr val="tx1"/>
-          </a:solidFill>
+        </p:spPr>
+      </p:pic>
+      <p:sp>
+        <p:nvSpPr>
+          <p:cNvPr id="8" name="CaixaDeTexto 7">
+            <a:extLst>
+              <a:ext uri="{FF2B5EF4-FFF2-40B4-BE49-F238E27FC236}">
+                <a16:creationId xmlns:a16="http://schemas.microsoft.com/office/drawing/2014/main" id="{E20DEB4C-DCE3-4E28-B85C-9C0FAB0B3ECA}"/>
+              </a:ext>
+            </a:extLst>
+          </p:cNvPr>
+          <p:cNvSpPr txBox="1"/>
+          <p:nvPr/>
+        </p:nvSpPr>
+        <p:spPr>
+          <a:xfrm>
+            <a:off x="7454349" y="4832094"/>
+            <a:ext cx="3896946" cy="461665"/>
+          </a:xfrm>
+          <a:prstGeom prst="rect">
+            <a:avLst/>
+          </a:prstGeom>
+          <a:noFill/>
         </p:spPr>
         <p:txBody>
           <a:bodyPr wrap="square" rtlCol="0">
@@ -8190,22 +7949,27 @@
           </a:bodyPr>
           <a:lstStyle/>
           <a:p>
-            <a:pPr algn="ctr"/>
-            <a:r>
-              <a:rPr lang="pt-BR" sz="2000" b="1" dirty="0">
-                <a:solidFill>
-                  <a:schemeClr val="bg2"/>
-                </a:solidFill>
+            <a:r>
+              <a:rPr lang="pt-BR" sz="1200" dirty="0">
                 <a:latin typeface="Helvetica" pitchFamily="2" charset="0"/>
                 <a:cs typeface="Arial" panose="020B0604020202020204" pitchFamily="34" charset="0"/>
               </a:rPr>
-              <a:t>NOTAÇÃO</a:t>
-            </a:r>
-            <a:endParaRPr lang="pt-BR" sz="2000" dirty="0">
-              <a:solidFill>
-                <a:schemeClr val="bg2"/>
-              </a:solidFill>
-            </a:endParaRPr>
+              <a:t>Figura 1: Exemplo da ação de K-</a:t>
+            </a:r>
+            <a:r>
+              <a:rPr lang="pt-BR" sz="1200" dirty="0" err="1">
+                <a:latin typeface="Helvetica" pitchFamily="2" charset="0"/>
+                <a:cs typeface="Arial" panose="020B0604020202020204" pitchFamily="34" charset="0"/>
+              </a:rPr>
+              <a:t>Means</a:t>
+            </a:r>
+            <a:r>
+              <a:rPr lang="pt-BR" sz="1200" dirty="0">
+                <a:latin typeface="Helvetica" pitchFamily="2" charset="0"/>
+                <a:cs typeface="Arial" panose="020B0604020202020204" pitchFamily="34" charset="0"/>
+              </a:rPr>
+              <a:t> a partir da distância entre pontos e centroides</a:t>
+            </a:r>
           </a:p>
         </p:txBody>
       </p:sp>
@@ -8285,7 +8049,7 @@
                 <a:latin typeface="Helvetica" pitchFamily="2" charset="0"/>
                 <a:cs typeface="Arial" panose="020B0604020202020204" pitchFamily="34" charset="0"/>
               </a:rPr>
-              <a:t>Visualização</a:t>
+              <a:t>Funcionamento</a:t>
             </a:r>
           </a:p>
         </p:txBody>
@@ -8309,7 +8073,7 @@
         <p:spPr>
           <a:xfrm>
             <a:off x="838200" y="1825625"/>
-            <a:ext cx="5815520" cy="4489450"/>
+            <a:ext cx="5903068" cy="4489450"/>
           </a:xfrm>
         </p:spPr>
         <p:txBody>
@@ -8352,7 +8116,7 @@
                 </a:solidFill>
                 <a:latin typeface="Helvetica" pitchFamily="2" charset="0"/>
               </a:rPr>
-              <a:t>, os pontos são distribuídos conforme seus valores (Figura 1). </a:t>
+              <a:t>, os pontos são distribuídos conforme seus valores (Figura 2). </a:t>
             </a:r>
           </a:p>
           <a:p>
@@ -8389,7 +8153,7 @@
                 </a:solidFill>
                 <a:latin typeface="Helvetica" pitchFamily="2" charset="0"/>
               </a:rPr>
-              <a:t>Com a quantidade de clusters pré-determinada, são calculados os centroides a partir da minimização do quadrado das distâncias (Figura 2). Os pontos próximos aos centroides foram clusters (Figura 3).</a:t>
+              <a:t>Com a quantidade de clusters pré-determinada, são calculados os centroides a partir da minimização do quadrado das distâncias (Figura 3). Os pontos próximos aos centroides foram clusters (Figura 4).</a:t>
             </a:r>
           </a:p>
           <a:p>
@@ -8426,7 +8190,7 @@
                 </a:solidFill>
                 <a:latin typeface="Helvetica" pitchFamily="2" charset="0"/>
               </a:rPr>
-              <a:t>Os pontos que não se encontram nos clusters são considerados anomalias (Figura 4).</a:t>
+              <a:t>Os pontos que não se encontram nos clusters são considerados anomalias (Figura 5).</a:t>
             </a:r>
             <a:endParaRPr lang="pt-BR" sz="2000" b="0" i="0" u="none" strike="noStrike" dirty="0">
               <a:solidFill>
@@ -8472,8 +8236,8 @@
           </p:nvSpPr>
           <p:spPr>
             <a:xfrm>
-              <a:off x="10252872" y="2139694"/>
-              <a:ext cx="1100928" cy="276999"/>
+              <a:off x="7172323" y="2139694"/>
+              <a:ext cx="4181477" cy="276999"/>
             </a:xfrm>
             <a:prstGeom prst="rect">
               <a:avLst/>
@@ -8486,13 +8250,12 @@
             </a:bodyPr>
             <a:lstStyle/>
             <a:p>
-              <a:pPr algn="r"/>
               <a:r>
                 <a:rPr lang="pt-BR" sz="1200" dirty="0">
                   <a:latin typeface="Helvetica" pitchFamily="2" charset="0"/>
                   <a:cs typeface="Arial" panose="020B0604020202020204" pitchFamily="34" charset="0"/>
                 </a:rPr>
-                <a:t>Figura 1</a:t>
+                <a:t>Figura 2: Dispersão de dados</a:t>
               </a:r>
             </a:p>
           </p:txBody>
@@ -8571,8 +8334,8 @@
           </p:nvSpPr>
           <p:spPr>
             <a:xfrm>
-              <a:off x="10252872" y="3268461"/>
-              <a:ext cx="1100928" cy="276999"/>
+              <a:off x="7172323" y="3268461"/>
+              <a:ext cx="4181477" cy="276999"/>
             </a:xfrm>
             <a:prstGeom prst="rect">
               <a:avLst/>
@@ -8585,13 +8348,12 @@
             </a:bodyPr>
             <a:lstStyle/>
             <a:p>
-              <a:pPr algn="r"/>
               <a:r>
                 <a:rPr lang="pt-BR" sz="1200" dirty="0">
                   <a:latin typeface="Helvetica" pitchFamily="2" charset="0"/>
                   <a:cs typeface="Arial" panose="020B0604020202020204" pitchFamily="34" charset="0"/>
                 </a:rPr>
-                <a:t>Figura 2</a:t>
+                <a:t>Figura 3: Seleção de centroides</a:t>
               </a:r>
             </a:p>
           </p:txBody>
@@ -8670,8 +8432,8 @@
           </p:nvSpPr>
           <p:spPr>
             <a:xfrm>
-              <a:off x="10252872" y="4445868"/>
-              <a:ext cx="1100928" cy="276999"/>
+              <a:off x="7172323" y="4445868"/>
+              <a:ext cx="4181477" cy="276999"/>
             </a:xfrm>
             <a:prstGeom prst="rect">
               <a:avLst/>
@@ -8684,13 +8446,12 @@
             </a:bodyPr>
             <a:lstStyle/>
             <a:p>
-              <a:pPr algn="r"/>
               <a:r>
                 <a:rPr lang="pt-BR" sz="1200" dirty="0">
                   <a:latin typeface="Helvetica" pitchFamily="2" charset="0"/>
                   <a:cs typeface="Arial" panose="020B0604020202020204" pitchFamily="34" charset="0"/>
                 </a:rPr>
-                <a:t>Figura 3</a:t>
+                <a:t>Figura 4: Clusterização</a:t>
               </a:r>
             </a:p>
           </p:txBody>
@@ -8769,8 +8530,8 @@
           </p:nvSpPr>
           <p:spPr>
             <a:xfrm>
-              <a:off x="10252872" y="5409258"/>
-              <a:ext cx="1100928" cy="276999"/>
+              <a:off x="7172323" y="5409258"/>
+              <a:ext cx="4181477" cy="276999"/>
             </a:xfrm>
             <a:prstGeom prst="rect">
               <a:avLst/>
@@ -8783,13 +8544,12 @@
             </a:bodyPr>
             <a:lstStyle/>
             <a:p>
-              <a:pPr algn="r"/>
               <a:r>
                 <a:rPr lang="pt-BR" sz="1200" dirty="0">
                   <a:latin typeface="Helvetica" pitchFamily="2" charset="0"/>
                   <a:cs typeface="Arial" panose="020B0604020202020204" pitchFamily="34" charset="0"/>
                 </a:rPr>
-                <a:t>Figura 4</a:t>
+                <a:t>Figura 5: Detecção de anomalias</a:t>
               </a:r>
             </a:p>
           </p:txBody>
@@ -9871,7 +9631,7 @@
                     </a:solidFill>
                     <a:latin typeface="Helvetica" pitchFamily="2" charset="0"/>
                   </a:rPr>
-                  <a:t>Em determinado momento, a diferença se tornará marginal. Graficamente, forma-se um "cotovelo“ (Figura 5). O ponto em que essa estabilização se torna perceptível representa uma estimativa do número ideal de clusters.</a:t>
+                  <a:t>Em determinado momento, a diferença se tornará marginal. Graficamente, forma-se um "cotovelo“ (Figura 6). O ponto em que essa estabilização se torna perceptível representa uma estimativa do número ideal de clusters.</a:t>
                 </a:r>
                 <a:endParaRPr lang="pt-BR" sz="2000" b="0" i="0" u="none" strike="noStrike" dirty="0">
                   <a:solidFill>
@@ -9981,8 +9741,8 @@
         </p:nvSpPr>
         <p:spPr>
           <a:xfrm>
-            <a:off x="10252872" y="4440087"/>
-            <a:ext cx="1100928" cy="276999"/>
+            <a:off x="6096000" y="4440087"/>
+            <a:ext cx="5257800" cy="461665"/>
           </a:xfrm>
           <a:prstGeom prst="rect">
             <a:avLst/>
@@ -9995,13 +9755,12 @@
           </a:bodyPr>
           <a:lstStyle/>
           <a:p>
-            <a:pPr algn="r"/>
             <a:r>
               <a:rPr lang="pt-BR" sz="1200" dirty="0">
                 <a:latin typeface="Helvetica" pitchFamily="2" charset="0"/>
                 <a:cs typeface="Arial" panose="020B0604020202020204" pitchFamily="34" charset="0"/>
               </a:rPr>
-              <a:t>Figura 5</a:t>
+              <a:t>Figura 6: Exemplo da aplicação do método do cotovelo para determinação da quantidade de clusters ideal</a:t>
             </a:r>
           </a:p>
         </p:txBody>

</xml_diff>